<commit_message>
Project Report Draft Final
</commit_message>
<xml_diff>
--- a/Client Server Simulation.pptx
+++ b/Client Server Simulation.pptx
@@ -112,6 +112,22 @@
       </a:defRPr>
     </a:lvl9pPr>
   </p:defaultTextStyle>
+  <p:extLst>
+    <p:ext uri="{EFAFB233-063F-42B5-8137-9DF3F51BA10A}">
+      <p15:sldGuideLst xmlns:p15="http://schemas.microsoft.com/office/powerpoint/2012/main">
+        <p15:guide id="1" orient="horz" pos="2160">
+          <p15:clr>
+            <a:srgbClr val="A4A3A4"/>
+          </p15:clr>
+        </p15:guide>
+        <p15:guide id="2" pos="2880">
+          <p15:clr>
+            <a:srgbClr val="A4A3A4"/>
+          </p15:clr>
+        </p15:guide>
+      </p15:sldGuideLst>
+    </p:ext>
+  </p:extLst>
 </p:presentation>
 </file>
 
@@ -296,7 +312,7 @@
           <a:p>
             <a:fld id="{6631A9DF-8E45-4FAD-804E-E0CDC676AF4F}" type="datetimeFigureOut">
               <a:rPr lang="en-IN" smtClean="0"/>
-              <a:t>09-05-2018</a:t>
+              <a:t>10/05/18</a:t>
             </a:fld>
             <a:endParaRPr lang="en-IN"/>
           </a:p>
@@ -466,7 +482,7 @@
           <a:p>
             <a:fld id="{6631A9DF-8E45-4FAD-804E-E0CDC676AF4F}" type="datetimeFigureOut">
               <a:rPr lang="en-IN" smtClean="0"/>
-              <a:t>09-05-2018</a:t>
+              <a:t>10/05/18</a:t>
             </a:fld>
             <a:endParaRPr lang="en-IN"/>
           </a:p>
@@ -646,7 +662,7 @@
           <a:p>
             <a:fld id="{6631A9DF-8E45-4FAD-804E-E0CDC676AF4F}" type="datetimeFigureOut">
               <a:rPr lang="en-IN" smtClean="0"/>
-              <a:t>09-05-2018</a:t>
+              <a:t>10/05/18</a:t>
             </a:fld>
             <a:endParaRPr lang="en-IN"/>
           </a:p>
@@ -816,7 +832,7 @@
           <a:p>
             <a:fld id="{6631A9DF-8E45-4FAD-804E-E0CDC676AF4F}" type="datetimeFigureOut">
               <a:rPr lang="en-IN" smtClean="0"/>
-              <a:t>09-05-2018</a:t>
+              <a:t>10/05/18</a:t>
             </a:fld>
             <a:endParaRPr lang="en-IN"/>
           </a:p>
@@ -1062,7 +1078,7 @@
           <a:p>
             <a:fld id="{6631A9DF-8E45-4FAD-804E-E0CDC676AF4F}" type="datetimeFigureOut">
               <a:rPr lang="en-IN" smtClean="0"/>
-              <a:t>09-05-2018</a:t>
+              <a:t>10/05/18</a:t>
             </a:fld>
             <a:endParaRPr lang="en-IN"/>
           </a:p>
@@ -1350,7 +1366,7 @@
           <a:p>
             <a:fld id="{6631A9DF-8E45-4FAD-804E-E0CDC676AF4F}" type="datetimeFigureOut">
               <a:rPr lang="en-IN" smtClean="0"/>
-              <a:t>09-05-2018</a:t>
+              <a:t>10/05/18</a:t>
             </a:fld>
             <a:endParaRPr lang="en-IN"/>
           </a:p>
@@ -1772,7 +1788,7 @@
           <a:p>
             <a:fld id="{6631A9DF-8E45-4FAD-804E-E0CDC676AF4F}" type="datetimeFigureOut">
               <a:rPr lang="en-IN" smtClean="0"/>
-              <a:t>09-05-2018</a:t>
+              <a:t>10/05/18</a:t>
             </a:fld>
             <a:endParaRPr lang="en-IN"/>
           </a:p>
@@ -1890,7 +1906,7 @@
           <a:p>
             <a:fld id="{6631A9DF-8E45-4FAD-804E-E0CDC676AF4F}" type="datetimeFigureOut">
               <a:rPr lang="en-IN" smtClean="0"/>
-              <a:t>09-05-2018</a:t>
+              <a:t>10/05/18</a:t>
             </a:fld>
             <a:endParaRPr lang="en-IN"/>
           </a:p>
@@ -1985,7 +2001,7 @@
           <a:p>
             <a:fld id="{6631A9DF-8E45-4FAD-804E-E0CDC676AF4F}" type="datetimeFigureOut">
               <a:rPr lang="en-IN" smtClean="0"/>
-              <a:t>09-05-2018</a:t>
+              <a:t>10/05/18</a:t>
             </a:fld>
             <a:endParaRPr lang="en-IN"/>
           </a:p>
@@ -2262,7 +2278,7 @@
           <a:p>
             <a:fld id="{6631A9DF-8E45-4FAD-804E-E0CDC676AF4F}" type="datetimeFigureOut">
               <a:rPr lang="en-IN" smtClean="0"/>
-              <a:t>09-05-2018</a:t>
+              <a:t>10/05/18</a:t>
             </a:fld>
             <a:endParaRPr lang="en-IN"/>
           </a:p>
@@ -2515,7 +2531,7 @@
           <a:p>
             <a:fld id="{6631A9DF-8E45-4FAD-804E-E0CDC676AF4F}" type="datetimeFigureOut">
               <a:rPr lang="en-IN" smtClean="0"/>
-              <a:t>09-05-2018</a:t>
+              <a:t>10/05/18</a:t>
             </a:fld>
             <a:endParaRPr lang="en-IN"/>
           </a:p>
@@ -2728,7 +2744,7 @@
           <a:p>
             <a:fld id="{6631A9DF-8E45-4FAD-804E-E0CDC676AF4F}" type="datetimeFigureOut">
               <a:rPr lang="en-IN" smtClean="0"/>
-              <a:t>09-05-2018</a:t>
+              <a:t>10/05/18</a:t>
             </a:fld>
             <a:endParaRPr lang="en-IN"/>
           </a:p>
@@ -4394,15 +4410,19 @@
             </a:pPr>
             <a:r>
               <a:rPr lang="en-IN" dirty="0" smtClean="0"/>
-              <a:t>We thank all our friends and family for </a:t>
-            </a:r>
-            <a:r>
-              <a:rPr lang="en-IN" dirty="0" err="1" smtClean="0"/>
-              <a:t>ther</a:t>
+              <a:t>We thank all our friends and family </a:t>
+            </a:r>
+            <a:r>
+              <a:rPr lang="en-IN" smtClean="0"/>
+              <a:t>for </a:t>
+            </a:r>
+            <a:r>
+              <a:rPr lang="en-IN" smtClean="0"/>
+              <a:t>their </a:t>
             </a:r>
             <a:r>
               <a:rPr lang="en-IN" dirty="0" smtClean="0"/>
-              <a:t> support.</a:t>
+              <a:t>support.</a:t>
             </a:r>
           </a:p>
           <a:p>

</xml_diff>